<commit_message>
Fix of the hyperlink in presentation
</commit_message>
<xml_diff>
--- a/Documentation/ПрезентацияTurnBasedStrategy.pptx
+++ b/Documentation/ПрезентацияTurnBasedStrategy.pptx
@@ -200,7 +200,8 @@
           <a:p>
             <a:fld id="{E67FDF0B-72B6-4234-86AF-9660BDDA2EE4}" type="datetimeFigureOut">
               <a:rPr lang="ru-RU" smtClean="0"/>
-              <a:t>21.12.2020</a:t>
+              <a:pPr/>
+              <a:t>22.12.2020</a:t>
             </a:fld>
             <a:endParaRPr lang="ru-RU"/>
           </a:p>
@@ -361,6 +362,7 @@
           <a:p>
             <a:fld id="{A27D45F8-D7B5-41CF-A691-A905E141EBD9}" type="slidenum">
               <a:rPr lang="ru-RU" smtClean="0"/>
+              <a:pPr/>
               <a:t>‹#›</a:t>
             </a:fld>
             <a:endParaRPr lang="ru-RU"/>
@@ -684,7 +686,8 @@
           <a:p>
             <a:fld id="{9E2EBBBB-F85A-42EC-A9FE-E3E7C4097D19}" type="datetimeFigureOut">
               <a:rPr lang="ru-RU" smtClean="0"/>
-              <a:t>21.12.2020</a:t>
+              <a:pPr/>
+              <a:t>22.12.2020</a:t>
             </a:fld>
             <a:endParaRPr lang="ru-RU"/>
           </a:p>
@@ -748,6 +751,7 @@
           <a:p>
             <a:fld id="{8441579E-B72F-4D57-9C5E-F3D7FE25588F}" type="slidenum">
               <a:rPr lang="ru-RU" smtClean="0"/>
+              <a:pPr/>
               <a:t>‹#›</a:t>
             </a:fld>
             <a:endParaRPr lang="ru-RU"/>
@@ -871,7 +875,8 @@
           <a:p>
             <a:fld id="{9E2EBBBB-F85A-42EC-A9FE-E3E7C4097D19}" type="datetimeFigureOut">
               <a:rPr lang="ru-RU" smtClean="0"/>
-              <a:t>21.12.2020</a:t>
+              <a:pPr/>
+              <a:t>22.12.2020</a:t>
             </a:fld>
             <a:endParaRPr lang="ru-RU"/>
           </a:p>
@@ -913,6 +918,7 @@
           <a:p>
             <a:fld id="{8441579E-B72F-4D57-9C5E-F3D7FE25588F}" type="slidenum">
               <a:rPr lang="ru-RU" smtClean="0"/>
+              <a:pPr/>
               <a:t>‹#›</a:t>
             </a:fld>
             <a:endParaRPr lang="ru-RU"/>
@@ -1046,7 +1052,8 @@
           <a:p>
             <a:fld id="{9E2EBBBB-F85A-42EC-A9FE-E3E7C4097D19}" type="datetimeFigureOut">
               <a:rPr lang="ru-RU" smtClean="0"/>
-              <a:t>21.12.2020</a:t>
+              <a:pPr/>
+              <a:t>22.12.2020</a:t>
             </a:fld>
             <a:endParaRPr lang="ru-RU"/>
           </a:p>
@@ -1088,6 +1095,7 @@
           <a:p>
             <a:fld id="{8441579E-B72F-4D57-9C5E-F3D7FE25588F}" type="slidenum">
               <a:rPr lang="ru-RU" smtClean="0"/>
+              <a:pPr/>
               <a:t>‹#›</a:t>
             </a:fld>
             <a:endParaRPr lang="ru-RU"/>
@@ -1226,7 +1234,8 @@
           <a:p>
             <a:fld id="{9E2EBBBB-F85A-42EC-A9FE-E3E7C4097D19}" type="datetimeFigureOut">
               <a:rPr lang="ru-RU" smtClean="0"/>
-              <a:t>21.12.2020</a:t>
+              <a:pPr/>
+              <a:t>22.12.2020</a:t>
             </a:fld>
             <a:endParaRPr lang="ru-RU"/>
           </a:p>
@@ -1273,6 +1282,7 @@
           <a:p>
             <a:fld id="{8441579E-B72F-4D57-9C5E-F3D7FE25588F}" type="slidenum">
               <a:rPr lang="ru-RU" smtClean="0"/>
+              <a:pPr/>
               <a:t>‹#›</a:t>
             </a:fld>
             <a:endParaRPr lang="ru-RU"/>
@@ -1473,7 +1483,8 @@
           <a:p>
             <a:fld id="{9E2EBBBB-F85A-42EC-A9FE-E3E7C4097D19}" type="datetimeFigureOut">
               <a:rPr lang="ru-RU" smtClean="0"/>
-              <a:t>21.12.2020</a:t>
+              <a:pPr/>
+              <a:t>22.12.2020</a:t>
             </a:fld>
             <a:endParaRPr lang="ru-RU"/>
           </a:p>
@@ -1525,6 +1536,7 @@
           <a:p>
             <a:fld id="{8441579E-B72F-4D57-9C5E-F3D7FE25588F}" type="slidenum">
               <a:rPr lang="ru-RU" smtClean="0"/>
+              <a:pPr/>
               <a:t>‹#›</a:t>
             </a:fld>
             <a:endParaRPr lang="ru-RU"/>
@@ -1947,7 +1959,8 @@
           <a:p>
             <a:fld id="{9E2EBBBB-F85A-42EC-A9FE-E3E7C4097D19}" type="datetimeFigureOut">
               <a:rPr lang="ru-RU" smtClean="0"/>
-              <a:t>21.12.2020</a:t>
+              <a:pPr/>
+              <a:t>22.12.2020</a:t>
             </a:fld>
             <a:endParaRPr lang="ru-RU"/>
           </a:p>
@@ -1999,6 +2012,7 @@
           <a:p>
             <a:fld id="{8441579E-B72F-4D57-9C5E-F3D7FE25588F}" type="slidenum">
               <a:rPr lang="ru-RU" smtClean="0"/>
+              <a:pPr/>
               <a:t>‹#›</a:t>
             </a:fld>
             <a:endParaRPr lang="ru-RU"/>
@@ -2362,7 +2376,8 @@
           <a:p>
             <a:fld id="{9E2EBBBB-F85A-42EC-A9FE-E3E7C4097D19}" type="datetimeFigureOut">
               <a:rPr lang="ru-RU" smtClean="0"/>
-              <a:t>21.12.2020</a:t>
+              <a:pPr/>
+              <a:t>22.12.2020</a:t>
             </a:fld>
             <a:endParaRPr lang="ru-RU"/>
           </a:p>
@@ -2418,6 +2433,7 @@
           <a:p>
             <a:fld id="{8441579E-B72F-4D57-9C5E-F3D7FE25588F}" type="slidenum">
               <a:rPr lang="ru-RU" smtClean="0"/>
+              <a:pPr/>
               <a:t>‹#›</a:t>
             </a:fld>
             <a:endParaRPr lang="ru-RU"/>
@@ -2493,7 +2509,8 @@
           <a:p>
             <a:fld id="{9E2EBBBB-F85A-42EC-A9FE-E3E7C4097D19}" type="datetimeFigureOut">
               <a:rPr lang="ru-RU" smtClean="0"/>
-              <a:t>21.12.2020</a:t>
+              <a:pPr/>
+              <a:t>22.12.2020</a:t>
             </a:fld>
             <a:endParaRPr lang="ru-RU"/>
           </a:p>
@@ -2535,6 +2552,7 @@
           <a:p>
             <a:fld id="{8441579E-B72F-4D57-9C5E-F3D7FE25588F}" type="slidenum">
               <a:rPr lang="ru-RU" smtClean="0"/>
+              <a:pPr/>
               <a:t>‹#›</a:t>
             </a:fld>
             <a:endParaRPr lang="ru-RU"/>
@@ -2588,7 +2606,8 @@
           <a:p>
             <a:fld id="{9E2EBBBB-F85A-42EC-A9FE-E3E7C4097D19}" type="datetimeFigureOut">
               <a:rPr lang="ru-RU" smtClean="0"/>
-              <a:t>21.12.2020</a:t>
+              <a:pPr/>
+              <a:t>22.12.2020</a:t>
             </a:fld>
             <a:endParaRPr lang="ru-RU"/>
           </a:p>
@@ -2640,6 +2659,7 @@
           <a:p>
             <a:fld id="{8441579E-B72F-4D57-9C5E-F3D7FE25588F}" type="slidenum">
               <a:rPr lang="ru-RU" smtClean="0"/>
+              <a:pPr/>
               <a:t>‹#›</a:t>
             </a:fld>
             <a:endParaRPr lang="ru-RU"/>
@@ -2866,7 +2886,8 @@
           <a:p>
             <a:fld id="{9E2EBBBB-F85A-42EC-A9FE-E3E7C4097D19}" type="datetimeFigureOut">
               <a:rPr lang="ru-RU" smtClean="0"/>
-              <a:t>21.12.2020</a:t>
+              <a:pPr/>
+              <a:t>22.12.2020</a:t>
             </a:fld>
             <a:endParaRPr lang="ru-RU"/>
           </a:p>
@@ -2926,6 +2947,7 @@
           <a:p>
             <a:fld id="{8441579E-B72F-4D57-9C5E-F3D7FE25588F}" type="slidenum">
               <a:rPr lang="ru-RU" smtClean="0"/>
+              <a:pPr/>
               <a:t>‹#›</a:t>
             </a:fld>
             <a:endParaRPr lang="ru-RU"/>
@@ -3118,7 +3140,8 @@
           <a:p>
             <a:fld id="{9E2EBBBB-F85A-42EC-A9FE-E3E7C4097D19}" type="datetimeFigureOut">
               <a:rPr lang="ru-RU" smtClean="0"/>
-              <a:t>21.12.2020</a:t>
+              <a:pPr/>
+              <a:t>22.12.2020</a:t>
             </a:fld>
             <a:endParaRPr lang="ru-RU"/>
           </a:p>
@@ -3178,6 +3201,7 @@
           <a:p>
             <a:fld id="{8441579E-B72F-4D57-9C5E-F3D7FE25588F}" type="slidenum">
               <a:rPr lang="ru-RU" smtClean="0"/>
+              <a:pPr/>
               <a:t>‹#›</a:t>
             </a:fld>
             <a:endParaRPr lang="ru-RU"/>
@@ -3490,7 +3514,8 @@
           <a:p>
             <a:fld id="{9E2EBBBB-F85A-42EC-A9FE-E3E7C4097D19}" type="datetimeFigureOut">
               <a:rPr lang="ru-RU" smtClean="0"/>
-              <a:t>21.12.2020</a:t>
+              <a:pPr/>
+              <a:t>22.12.2020</a:t>
             </a:fld>
             <a:endParaRPr lang="ru-RU"/>
           </a:p>
@@ -3564,6 +3589,7 @@
           <a:p>
             <a:fld id="{8441579E-B72F-4D57-9C5E-F3D7FE25588F}" type="slidenum">
               <a:rPr lang="ru-RU" smtClean="0"/>
+              <a:pPr/>
               <a:t>‹#›</a:t>
             </a:fld>
             <a:endParaRPr lang="ru-RU"/>
@@ -4874,11 +4900,7 @@
             </a:pPr>
             <a:r>
               <a:rPr lang="ru-RU" dirty="0" smtClean="0"/>
-              <a:t>	</a:t>
-            </a:r>
-            <a:r>
-              <a:rPr lang="ru-RU" dirty="0" smtClean="0"/>
-              <a:t>1. Подогнать механики игры под новую идею</a:t>
+              <a:t>	1. Подогнать механики игры под новую идею</a:t>
             </a:r>
           </a:p>
           <a:p>
@@ -4913,11 +4935,7 @@
             </a:pPr>
             <a:r>
               <a:rPr lang="ru-RU" smtClean="0"/>
-              <a:t>	</a:t>
-            </a:r>
-            <a:r>
-              <a:rPr lang="ru-RU" smtClean="0"/>
-              <a:t>4. Нарисовать </a:t>
+              <a:t>	4. Нарисовать </a:t>
             </a:r>
             <a:r>
               <a:rPr lang="ru-RU" dirty="0" err="1" smtClean="0"/>
@@ -5005,7 +5023,7 @@
         </p:nvSpPr>
         <p:spPr>
           <a:xfrm>
-            <a:off x="179512" y="5733256"/>
+            <a:off x="0" y="5661248"/>
             <a:ext cx="6899646" cy="923330"/>
           </a:xfrm>
           <a:prstGeom prst="rect">
@@ -5056,8 +5074,8 @@
           </a:p>
           <a:p>
             <a:r>
-              <a:rPr lang="en-US" dirty="0" smtClean="0"/>
-              <a:t>https://github.com/SyrtcevVadim/MyCivilization</a:t>
+              <a:rPr lang="en-US" smtClean="0"/>
+              <a:t>https://github.com/SyrtcevVadim/TerritoryRejection</a:t>
             </a:r>
             <a:endParaRPr lang="ru-RU" dirty="0"/>
           </a:p>

</xml_diff>